<commit_message>
novo logo e atualização vinheta com digrama atualizado com nova função copia_premissas
</commit_message>
<xml_diff>
--- a/metodologia/fluxo_funcoes.pptx
+++ b/metodologia/fluxo_funcoes.pptx
@@ -243,7 +243,7 @@
           <a:p>
             <a:fld id="{6E837E62-3F50-4DC5-847B-FFE30D7C161D}" type="datetimeFigureOut">
               <a:rPr lang="en-US" smtClean="0"/>
-              <a:t>1/10/2023</a:t>
+              <a:t>1/24/2023</a:t>
             </a:fld>
             <a:endParaRPr lang="en-US"/>
           </a:p>
@@ -413,7 +413,7 @@
           <a:p>
             <a:fld id="{6E837E62-3F50-4DC5-847B-FFE30D7C161D}" type="datetimeFigureOut">
               <a:rPr lang="en-US" smtClean="0"/>
-              <a:t>1/10/2023</a:t>
+              <a:t>1/24/2023</a:t>
             </a:fld>
             <a:endParaRPr lang="en-US"/>
           </a:p>
@@ -593,7 +593,7 @@
           <a:p>
             <a:fld id="{6E837E62-3F50-4DC5-847B-FFE30D7C161D}" type="datetimeFigureOut">
               <a:rPr lang="en-US" smtClean="0"/>
-              <a:t>1/10/2023</a:t>
+              <a:t>1/24/2023</a:t>
             </a:fld>
             <a:endParaRPr lang="en-US"/>
           </a:p>
@@ -763,7 +763,7 @@
           <a:p>
             <a:fld id="{6E837E62-3F50-4DC5-847B-FFE30D7C161D}" type="datetimeFigureOut">
               <a:rPr lang="en-US" smtClean="0"/>
-              <a:t>1/10/2023</a:t>
+              <a:t>1/24/2023</a:t>
             </a:fld>
             <a:endParaRPr lang="en-US"/>
           </a:p>
@@ -1009,7 +1009,7 @@
           <a:p>
             <a:fld id="{6E837E62-3F50-4DC5-847B-FFE30D7C161D}" type="datetimeFigureOut">
               <a:rPr lang="en-US" smtClean="0"/>
-              <a:t>1/10/2023</a:t>
+              <a:t>1/24/2023</a:t>
             </a:fld>
             <a:endParaRPr lang="en-US"/>
           </a:p>
@@ -1241,7 +1241,7 @@
           <a:p>
             <a:fld id="{6E837E62-3F50-4DC5-847B-FFE30D7C161D}" type="datetimeFigureOut">
               <a:rPr lang="en-US" smtClean="0"/>
-              <a:t>1/10/2023</a:t>
+              <a:t>1/24/2023</a:t>
             </a:fld>
             <a:endParaRPr lang="en-US"/>
           </a:p>
@@ -1608,7 +1608,7 @@
           <a:p>
             <a:fld id="{6E837E62-3F50-4DC5-847B-FFE30D7C161D}" type="datetimeFigureOut">
               <a:rPr lang="en-US" smtClean="0"/>
-              <a:t>1/10/2023</a:t>
+              <a:t>1/24/2023</a:t>
             </a:fld>
             <a:endParaRPr lang="en-US"/>
           </a:p>
@@ -1726,7 +1726,7 @@
           <a:p>
             <a:fld id="{6E837E62-3F50-4DC5-847B-FFE30D7C161D}" type="datetimeFigureOut">
               <a:rPr lang="en-US" smtClean="0"/>
-              <a:t>1/10/2023</a:t>
+              <a:t>1/24/2023</a:t>
             </a:fld>
             <a:endParaRPr lang="en-US"/>
           </a:p>
@@ -1821,7 +1821,7 @@
           <a:p>
             <a:fld id="{6E837E62-3F50-4DC5-847B-FFE30D7C161D}" type="datetimeFigureOut">
               <a:rPr lang="en-US" smtClean="0"/>
-              <a:t>1/10/2023</a:t>
+              <a:t>1/24/2023</a:t>
             </a:fld>
             <a:endParaRPr lang="en-US"/>
           </a:p>
@@ -2098,7 +2098,7 @@
           <a:p>
             <a:fld id="{6E837E62-3F50-4DC5-847B-FFE30D7C161D}" type="datetimeFigureOut">
               <a:rPr lang="en-US" smtClean="0"/>
-              <a:t>1/10/2023</a:t>
+              <a:t>1/24/2023</a:t>
             </a:fld>
             <a:endParaRPr lang="en-US"/>
           </a:p>
@@ -2351,7 +2351,7 @@
           <a:p>
             <a:fld id="{6E837E62-3F50-4DC5-847B-FFE30D7C161D}" type="datetimeFigureOut">
               <a:rPr lang="en-US" smtClean="0"/>
-              <a:t>1/10/2023</a:t>
+              <a:t>1/24/2023</a:t>
             </a:fld>
             <a:endParaRPr lang="en-US"/>
           </a:p>
@@ -2564,7 +2564,7 @@
           <a:p>
             <a:fld id="{6E837E62-3F50-4DC5-847B-FFE30D7C161D}" type="datetimeFigureOut">
               <a:rPr lang="en-US" smtClean="0"/>
-              <a:t>1/10/2023</a:t>
+              <a:t>1/24/2023</a:t>
             </a:fld>
             <a:endParaRPr lang="en-US"/>
           </a:p>
@@ -4684,6 +4684,65 @@
           </a:fontRef>
         </p:style>
       </p:cxnSp>
+      <p:sp>
+        <p:nvSpPr>
+          <p:cNvPr id="2" name="Retângulo 1">
+            <a:extLst>
+              <a:ext uri="{FF2B5EF4-FFF2-40B4-BE49-F238E27FC236}">
+                <a16:creationId xmlns:a16="http://schemas.microsoft.com/office/drawing/2014/main" id="{573BD905-FA20-ADAB-6322-CBFFDBE98FB9}"/>
+              </a:ext>
+            </a:extLst>
+          </p:cNvPr>
+          <p:cNvSpPr/>
+          <p:nvPr/>
+        </p:nvSpPr>
+        <p:spPr>
+          <a:xfrm>
+            <a:off x="1830677" y="3304544"/>
+            <a:ext cx="2077375" cy="415764"/>
+          </a:xfrm>
+          <a:prstGeom prst="rect">
+            <a:avLst/>
+          </a:prstGeom>
+          <a:solidFill>
+            <a:schemeClr val="tx1">
+              <a:lumMod val="65000"/>
+              <a:lumOff val="35000"/>
+            </a:schemeClr>
+          </a:solidFill>
+          <a:ln>
+            <a:noFill/>
+          </a:ln>
+        </p:spPr>
+        <p:style>
+          <a:lnRef idx="2">
+            <a:schemeClr val="accent1">
+              <a:shade val="50000"/>
+            </a:schemeClr>
+          </a:lnRef>
+          <a:fillRef idx="1">
+            <a:schemeClr val="accent1"/>
+          </a:fillRef>
+          <a:effectRef idx="0">
+            <a:schemeClr val="accent1"/>
+          </a:effectRef>
+          <a:fontRef idx="minor">
+            <a:schemeClr val="lt1"/>
+          </a:fontRef>
+        </p:style>
+        <p:txBody>
+          <a:bodyPr rtlCol="0" anchor="ctr"/>
+          <a:lstStyle/>
+          <a:p>
+            <a:pPr algn="ctr"/>
+            <a:r>
+              <a:rPr lang="pt-BR"/>
+              <a:t>copia_premissas</a:t>
+            </a:r>
+            <a:endParaRPr lang="en-US"/>
+          </a:p>
+        </p:txBody>
+      </p:sp>
     </p:spTree>
     <p:extLst>
       <p:ext uri="{BB962C8B-B14F-4D97-AF65-F5344CB8AC3E}">

</xml_diff>